<commit_message>
uploaded avatar samples and update project plan
</commit_message>
<xml_diff>
--- a/images/Robo-advisor design materials.pptx
+++ b/images/Robo-advisor design materials.pptx
@@ -13,6 +13,7 @@
     <p:sldId id="276" r:id="rId7"/>
     <p:sldId id="268" r:id="rId8"/>
     <p:sldId id="271" r:id="rId9"/>
+    <p:sldId id="277" r:id="rId10"/>
   </p:sldIdLst>
   <p:sldSz cx="12192000" cy="6858000"/>
   <p:notesSz cx="6858000" cy="9144000"/>
@@ -132,6 +133,11 @@
             <p14:sldId id="276"/>
             <p14:sldId id="268"/>
             <p14:sldId id="271"/>
+          </p14:sldIdLst>
+        </p14:section>
+        <p14:section name="feature refinement" id="{EECCD582-AA80-784C-AD60-6D06A4FC71C3}">
+          <p14:sldIdLst>
+            <p14:sldId id="277"/>
           </p14:sldIdLst>
         </p14:section>
       </p14:sectionLst>
@@ -6045,6 +6051,207 @@
 </p:sld>
 </file>
 
+<file path=ppt/slides/slide9.xml><?xml version="1.0" encoding="utf-8"?>
+<p:sld xmlns:a="http://schemas.openxmlformats.org/drawingml/2006/main" xmlns:r="http://schemas.openxmlformats.org/officeDocument/2006/relationships" xmlns:p="http://schemas.openxmlformats.org/presentationml/2006/main">
+  <p:cSld>
+    <p:spTree>
+      <p:nvGrpSpPr>
+        <p:cNvPr id="1" name=""/>
+        <p:cNvGrpSpPr/>
+        <p:nvPr/>
+      </p:nvGrpSpPr>
+      <p:grpSpPr>
+        <a:xfrm>
+          <a:off x="0" y="0"/>
+          <a:ext cx="0" cy="0"/>
+          <a:chOff x="0" y="0"/>
+          <a:chExt cx="0" cy="0"/>
+        </a:xfrm>
+      </p:grpSpPr>
+      <p:sp>
+        <p:nvSpPr>
+          <p:cNvPr id="2" name="Title 1"/>
+          <p:cNvSpPr>
+            <a:spLocks noGrp="1"/>
+          </p:cNvSpPr>
+          <p:nvPr>
+            <p:ph type="title"/>
+          </p:nvPr>
+        </p:nvSpPr>
+        <p:spPr/>
+        <p:txBody>
+          <a:bodyPr/>
+          <a:lstStyle/>
+          <a:p>
+            <a:r>
+              <a:rPr lang="en-US" dirty="0" smtClean="0"/>
+              <a:t>Slider to Pie</a:t>
+            </a:r>
+            <a:endParaRPr lang="en-US" dirty="0"/>
+          </a:p>
+        </p:txBody>
+      </p:sp>
+      <p:pic>
+        <p:nvPicPr>
+          <p:cNvPr id="4" name="Content Placeholder 3"/>
+          <p:cNvPicPr>
+            <a:picLocks noGrp="1" noChangeAspect="1"/>
+          </p:cNvPicPr>
+          <p:nvPr>
+            <p:ph idx="1"/>
+          </p:nvPr>
+        </p:nvPicPr>
+        <p:blipFill>
+          <a:blip r:embed="rId2">
+            <a:extLst>
+              <a:ext uri="{28A0092B-C50C-407E-A947-70E740481C1C}">
+                <a14:useLocalDpi xmlns:a14="http://schemas.microsoft.com/office/drawing/2010/main" val="0"/>
+              </a:ext>
+            </a:extLst>
+          </a:blip>
+          <a:stretch>
+            <a:fillRect/>
+          </a:stretch>
+        </p:blipFill>
+        <p:spPr>
+          <a:xfrm>
+            <a:off x="629987" y="2946525"/>
+            <a:ext cx="6614906" cy="2624095"/>
+          </a:xfrm>
+        </p:spPr>
+      </p:pic>
+      <p:sp>
+        <p:nvSpPr>
+          <p:cNvPr id="5" name="TextBox 4"/>
+          <p:cNvSpPr txBox="1"/>
+          <p:nvPr/>
+        </p:nvSpPr>
+        <p:spPr>
+          <a:xfrm>
+            <a:off x="838200" y="1479208"/>
+            <a:ext cx="2069413" cy="430887"/>
+          </a:xfrm>
+          <a:prstGeom prst="rect">
+            <a:avLst/>
+          </a:prstGeom>
+          <a:noFill/>
+        </p:spPr>
+        <p:txBody>
+          <a:bodyPr wrap="none" rtlCol="0">
+            <a:spAutoFit/>
+          </a:bodyPr>
+          <a:lstStyle/>
+          <a:p>
+            <a:r>
+              <a:rPr lang="en-US" sz="2200" b="1" dirty="0" smtClean="0"/>
+              <a:t>Current version:</a:t>
+            </a:r>
+            <a:endParaRPr lang="en-US" sz="2200" b="1" dirty="0"/>
+          </a:p>
+        </p:txBody>
+      </p:sp>
+      <p:pic>
+        <p:nvPicPr>
+          <p:cNvPr id="7" name="Picture 6"/>
+          <p:cNvPicPr>
+            <a:picLocks noChangeAspect="1"/>
+          </p:cNvPicPr>
+          <p:nvPr/>
+        </p:nvPicPr>
+        <p:blipFill rotWithShape="1">
+          <a:blip r:embed="rId3">
+            <a:extLst>
+              <a:ext uri="{28A0092B-C50C-407E-A947-70E740481C1C}">
+                <a14:useLocalDpi xmlns:a14="http://schemas.microsoft.com/office/drawing/2010/main" val="0"/>
+              </a:ext>
+            </a:extLst>
+          </a:blip>
+          <a:srcRect t="4217"/>
+          <a:stretch/>
+        </p:blipFill>
+        <p:spPr>
+          <a:xfrm>
+            <a:off x="7407442" y="2169763"/>
+            <a:ext cx="3352646" cy="3710796"/>
+          </a:xfrm>
+          <a:prstGeom prst="rect">
+            <a:avLst/>
+          </a:prstGeom>
+        </p:spPr>
+      </p:pic>
+      <p:sp>
+        <p:nvSpPr>
+          <p:cNvPr id="8" name="TextBox 7"/>
+          <p:cNvSpPr txBox="1"/>
+          <p:nvPr/>
+        </p:nvSpPr>
+        <p:spPr>
+          <a:xfrm>
+            <a:off x="7288990" y="1417652"/>
+            <a:ext cx="2388154" cy="430887"/>
+          </a:xfrm>
+          <a:prstGeom prst="rect">
+            <a:avLst/>
+          </a:prstGeom>
+          <a:noFill/>
+        </p:spPr>
+        <p:txBody>
+          <a:bodyPr wrap="none" rtlCol="0">
+            <a:spAutoFit/>
+          </a:bodyPr>
+          <a:lstStyle/>
+          <a:p>
+            <a:r>
+              <a:rPr lang="en-US" sz="2200" b="1" smtClean="0"/>
+              <a:t>Optimized </a:t>
+            </a:r>
+            <a:r>
+              <a:rPr lang="en-US" sz="2200" b="1" dirty="0" smtClean="0"/>
+              <a:t>version:</a:t>
+            </a:r>
+            <a:endParaRPr lang="en-US" sz="2200" b="1" dirty="0"/>
+          </a:p>
+        </p:txBody>
+      </p:sp>
+      <p:sp>
+        <p:nvSpPr>
+          <p:cNvPr id="9" name="TextBox 8"/>
+          <p:cNvSpPr txBox="1"/>
+          <p:nvPr/>
+        </p:nvSpPr>
+        <p:spPr>
+          <a:xfrm>
+            <a:off x="11515241" y="2898183"/>
+            <a:ext cx="184731" cy="369332"/>
+          </a:xfrm>
+          <a:prstGeom prst="rect">
+            <a:avLst/>
+          </a:prstGeom>
+          <a:noFill/>
+        </p:spPr>
+        <p:txBody>
+          <a:bodyPr wrap="none" rtlCol="0">
+            <a:spAutoFit/>
+          </a:bodyPr>
+          <a:lstStyle/>
+          <a:p>
+            <a:endParaRPr lang="en-US"/>
+          </a:p>
+        </p:txBody>
+      </p:sp>
+    </p:spTree>
+    <p:extLst>
+      <p:ext uri="{BB962C8B-B14F-4D97-AF65-F5344CB8AC3E}">
+        <p14:creationId xmlns:p14="http://schemas.microsoft.com/office/powerpoint/2010/main" val="1035067326"/>
+      </p:ext>
+    </p:extLst>
+  </p:cSld>
+  <p:clrMapOvr>
+    <a:masterClrMapping/>
+  </p:clrMapOvr>
+</p:sld>
+</file>
+
 <file path=ppt/theme/theme1.xml><?xml version="1.0" encoding="utf-8"?>
 <a:theme xmlns:a="http://schemas.openxmlformats.org/drawingml/2006/main" name="Office Theme">
   <a:themeElements>

</xml_diff>